<commit_message>
Update Distinguished Speaker Series - Sept 2020 - Databases for the Aspiring App Dev.pptx
</commit_message>
<xml_diff>
--- a/SELU/Distinguished Speaker Series - Sept 2020 - Databases for the Aspiring App Dev.pptx
+++ b/SELU/Distinguished Speaker Series - Sept 2020 - Databases for the Aspiring App Dev.pptx
@@ -177,6 +177,9 @@
         </p14:section>
       </p14:sectionLst>
     </p:ext>
+    <p:ext uri="{EFAFB233-063F-42B5-8137-9DF3F51BA10A}">
+      <p15:sldGuideLst xmlns:p15="http://schemas.microsoft.com/office/powerpoint/2012/main"/>
+    </p:ext>
   </p:extLst>
 </p:presentation>
 </file>
@@ -275,7 +278,7 @@
           <a:p>
             <a:fld id="{A91E1E51-D7E8-40C2-9B04-5B1665BDC7D3}" type="datetimeFigureOut">
               <a:rPr lang="en-US" smtClean="0"/>
-              <a:t>9/16/2020</a:t>
+              <a:t>9/17/2020</a:t>
             </a:fld>
             <a:endParaRPr lang="en-US"/>
           </a:p>
@@ -1087,7 +1090,33 @@
           </a:p>
           <a:p>
             <a:pPr lvl="1" fontAlgn="ctr"/>
-            <a:endParaRPr lang="en-US" dirty="0"/>
+            <a:r>
+              <a:rPr lang="en-US" dirty="0"/>
+              <a:t>There are dangers of "</a:t>
+            </a:r>
+            <a:r>
+              <a:rPr lang="en-US" dirty="0" err="1"/>
+              <a:t>silo'ing</a:t>
+            </a:r>
+            <a:r>
+              <a:rPr lang="en-US" dirty="0"/>
+              <a:t>" data in the Access, in Excel and spreadsheets in general, </a:t>
+            </a:r>
+            <a:r>
+              <a:rPr lang="en-US" dirty="0" err="1"/>
+              <a:t>PowerBI</a:t>
+            </a:r>
+            <a:r>
+              <a:rPr lang="en-US" dirty="0"/>
+              <a:t>, Tableau, or any data visualization tool.</a:t>
+            </a:r>
+          </a:p>
+          <a:p>
+            <a:pPr lvl="1" fontAlgn="ctr"/>
+            <a:r>
+              <a:rPr lang="en-US" dirty="0"/>
+              <a:t>Though, valuable tools for self-service business intelligence, those Microsoft Office tools are not a database! That’s not where the data should live, but they’re fine for data analysis.</a:t>
+            </a:r>
           </a:p>
           <a:p>
             <a:pPr lvl="1" fontAlgn="ctr"/>
@@ -1097,41 +1126,7 @@
             <a:pPr lvl="1" fontAlgn="ctr"/>
             <a:r>
               <a:rPr lang="en-US" dirty="0"/>
-              <a:t>There are dangers of "</a:t>
-            </a:r>
-            <a:r>
-              <a:rPr lang="en-US" dirty="0" err="1"/>
-              <a:t>silo'ing</a:t>
-            </a:r>
-            <a:r>
-              <a:rPr lang="en-US" dirty="0"/>
-              <a:t>" data in the Access, in Excel and spreadsheets in general, </a:t>
-            </a:r>
-            <a:r>
-              <a:rPr lang="en-US" dirty="0" err="1"/>
-              <a:t>PowerBI</a:t>
-            </a:r>
-            <a:r>
-              <a:rPr lang="en-US" dirty="0"/>
-              <a:t>, Tableau, or any data visualization tool.</a:t>
-            </a:r>
-          </a:p>
-          <a:p>
-            <a:pPr lvl="1" fontAlgn="ctr"/>
-            <a:r>
-              <a:rPr lang="en-US" dirty="0"/>
-              <a:t>Though, valuable tools for self-service business intelligence, those Microsoft tools are not a database! That’s not where the data should live, but they’re fine for data analysis.</a:t>
-            </a:r>
-          </a:p>
-          <a:p>
-            <a:pPr lvl="1" fontAlgn="ctr"/>
-            <a:endParaRPr lang="en-US" dirty="0"/>
-          </a:p>
-          <a:p>
-            <a:pPr lvl="1" fontAlgn="ctr"/>
-            <a:r>
-              <a:rPr lang="en-US" dirty="0"/>
-              <a:t>None of these options should be the primary data store of data, because none of these technologies have been designed with some key features in mind. </a:t>
+              <a:t>In fact, none of these options should be the primary data store of data, because none of these technologies have been designed with some key database features in mind. </a:t>
             </a:r>
           </a:p>
           <a:p>
@@ -2461,7 +2456,7 @@
             </a:pPr>
             <a:r>
               <a:rPr lang="en-US" dirty="0"/>
-              <a:t>Pessimistic transactions would rather your update wait for exclusive access to data than try to update data that’s already changed, or changing. If you can’t guarantee your update will be isolated, then wait. It assumes more than one cook in the kitchen.</a:t>
+              <a:t>Pessimistic transactions would rather your update wait for exclusive access to data than try to update data that’s already changed, or changing. If you can’t guarantee your update will be isolated, then wait. It assumes more than one cook in the kitchen, and that’s safer.</a:t>
             </a:r>
           </a:p>
           <a:p>
@@ -2470,7 +2465,15 @@
           <a:p>
             <a:r>
               <a:rPr lang="en-US" dirty="0"/>
-              <a:t>Optimistic transactions assume nobody else will be trying to change the ingredients, but if they do, somebody’s going to get burnt. And that’s ok, because they’ll just have to try again. And that’s as far as my tortured metaphor takes it, but optimistic transactions require the application, perhaps independently of the database, to quickly solve transaction conflicts, resolve merged data, pick winners, and cause losing transactions to fail.</a:t>
+              <a:t>Optimistic transactions assume nobody else will be trying to change the ingredients, but if they do, somebody’s going to get burnt. And that’s ok, because they’ll just have to try again. And that’s as far as my tortured metaphor takes it, but optimistic transactions require the application, perhaps independently of the database, to quickly solve transaction conflicts, resolve merged data, pick winners, and cause losing transactions to fail. Optimistic transactions fail when you go to delete or update rows, and they’re not there any more, or you go to read or update rows, and the rows or </a:t>
+            </a:r>
+            <a:r>
+              <a:rPr lang="en-US" dirty="0" err="1"/>
+              <a:t>rowcounts</a:t>
+            </a:r>
+            <a:r>
+              <a:rPr lang="en-US" dirty="0"/>
+              <a:t> have changed. It can become a real tangle, and the database and application need to be more sophisticated about transaction management, tiebreaking, and retry logic.</a:t>
             </a:r>
           </a:p>
           <a:p>
@@ -2479,13 +2482,19 @@
           <a:p>
             <a:r>
               <a:rPr lang="en-US" dirty="0"/>
-              <a:t>If you’re still not sure what to decide, review your system’s business requirements. A stock market where everyone must have access to the same price at the same time, and the price changes? Pessimistic concurrency is needed, or the market won’t be fair or trusted.</a:t>
+              <a:t>If you’re not sure what to decide, review your system’s business requirements. A stock market where everyone must have access to the same price at the same time, and the price changes? Pessimistic concurrency is needed, or the market won’t be fair or trusted.</a:t>
             </a:r>
           </a:p>
           <a:p>
             <a:r>
               <a:rPr lang="en-US" dirty="0"/>
               <a:t>Creating the next global social media app? Optimistic concurrency allows for globally distributed data that inserts well and scales for reads infinitely, but boy are updates a pain, and who cares if my tweet doesn’t show up in Egypt right away.</a:t>
+            </a:r>
+          </a:p>
+          <a:p>
+            <a:r>
+              <a:rPr lang="en-US" dirty="0"/>
+              <a:t>Something in between? I’d recommend starting with safety, and violating ACID principles only on demand, but not by design.</a:t>
             </a:r>
           </a:p>
         </p:txBody>
@@ -3451,15 +3460,73 @@
             </a:pPr>
             <a:r>
               <a:rPr lang="en-US" sz="1200" dirty="0"/>
-              <a:t>Rapid </a:t>
-            </a:r>
-            <a:r>
-              <a:rPr lang="en-US" sz="1200" dirty="0" err="1"/>
-              <a:t>hyperscaling</a:t>
-            </a:r>
+              <a:t>Rapid horizontal scaling with SQL solutions can be more complex than with NoSQL solutions. </a:t>
+            </a:r>
+          </a:p>
+          <a:p>
+            <a:pPr marL="0" marR="0" lvl="0" indent="0" algn="l" defTabSz="914400" rtl="0" eaLnBrk="1" fontAlgn="ctr" latinLnBrk="0" hangingPunct="1">
+              <a:lnSpc>
+                <a:spcPct val="120000"/>
+              </a:lnSpc>
+              <a:spcBef>
+                <a:spcPts val="0"/>
+              </a:spcBef>
+              <a:spcAft>
+                <a:spcPts val="0"/>
+              </a:spcAft>
+              <a:buClrTx/>
+              <a:buSzTx/>
+              <a:buFontTx/>
+              <a:buNone/>
+              <a:tabLst/>
+              <a:defRPr/>
+            </a:pPr>
+            <a:endParaRPr lang="en-US" sz="1200" dirty="0"/>
+          </a:p>
+          <a:p>
+            <a:pPr marL="0" marR="0" lvl="0" indent="0" algn="l" defTabSz="914400" rtl="0" eaLnBrk="1" fontAlgn="ctr" latinLnBrk="0" hangingPunct="1">
+              <a:lnSpc>
+                <a:spcPct val="120000"/>
+              </a:lnSpc>
+              <a:spcBef>
+                <a:spcPts val="0"/>
+              </a:spcBef>
+              <a:spcAft>
+                <a:spcPts val="0"/>
+              </a:spcAft>
+              <a:buClrTx/>
+              <a:buSzTx/>
+              <a:buFontTx/>
+              <a:buNone/>
+              <a:tabLst/>
+              <a:defRPr/>
+            </a:pPr>
             <a:r>
               <a:rPr lang="en-US" sz="1200" dirty="0"/>
-              <a:t> with SQL solutions can be more complex than with NoSQL solutions. </a:t>
+              <a:t>Vertical scaling, by the way, means having a bigger, faster server with more CPU, more memory.  Pretty simple.</a:t>
+            </a:r>
+          </a:p>
+          <a:p>
+            <a:pPr marL="0" marR="0" lvl="0" indent="0" algn="l" defTabSz="914400" rtl="0" eaLnBrk="1" fontAlgn="ctr" latinLnBrk="0" hangingPunct="1">
+              <a:lnSpc>
+                <a:spcPct val="120000"/>
+              </a:lnSpc>
+              <a:spcBef>
+                <a:spcPts val="0"/>
+              </a:spcBef>
+              <a:spcAft>
+                <a:spcPts val="0"/>
+              </a:spcAft>
+              <a:buClrTx/>
+              <a:buSzTx/>
+              <a:buFontTx/>
+              <a:buNone/>
+              <a:tabLst/>
+              <a:defRPr/>
+            </a:pPr>
+            <a:r>
+              <a:rPr lang="en-US" sz="1200" dirty="0"/>
+              <a:t>Horizontal scaling means having more servers hosting the same data. They can be distributed across various data centers, on various continents, even. This is more complex, but lots of NoSQL database platforms are designed for this, they have transaction coordinators and bidirectional synchronization built in, making it easy for developers.</a:t>
             </a:r>
           </a:p>
           <a:p>
@@ -6798,7 +6865,7 @@
           <a:p>
             <a:fld id="{FF797BD6-88EB-433B-A3D2-2B3B3AABDC4E}" type="datetimeFigureOut">
               <a:rPr lang="en-US" smtClean="0"/>
-              <a:t>9/16/2020</a:t>
+              <a:t>9/17/2020</a:t>
             </a:fld>
             <a:endParaRPr lang="en-US"/>
           </a:p>
@@ -6996,7 +7063,7 @@
           <a:p>
             <a:fld id="{FF797BD6-88EB-433B-A3D2-2B3B3AABDC4E}" type="datetimeFigureOut">
               <a:rPr lang="en-US" smtClean="0"/>
-              <a:t>9/16/2020</a:t>
+              <a:t>9/17/2020</a:t>
             </a:fld>
             <a:endParaRPr lang="en-US"/>
           </a:p>
@@ -7204,7 +7271,7 @@
           <a:p>
             <a:fld id="{FF797BD6-88EB-433B-A3D2-2B3B3AABDC4E}" type="datetimeFigureOut">
               <a:rPr lang="en-US" smtClean="0"/>
-              <a:t>9/16/2020</a:t>
+              <a:t>9/17/2020</a:t>
             </a:fld>
             <a:endParaRPr lang="en-US"/>
           </a:p>
@@ -7402,7 +7469,7 @@
           <a:p>
             <a:fld id="{FF797BD6-88EB-433B-A3D2-2B3B3AABDC4E}" type="datetimeFigureOut">
               <a:rPr lang="en-US" smtClean="0"/>
-              <a:t>9/16/2020</a:t>
+              <a:t>9/17/2020</a:t>
             </a:fld>
             <a:endParaRPr lang="en-US"/>
           </a:p>
@@ -7677,7 +7744,7 @@
           <a:p>
             <a:fld id="{FF797BD6-88EB-433B-A3D2-2B3B3AABDC4E}" type="datetimeFigureOut">
               <a:rPr lang="en-US" smtClean="0"/>
-              <a:t>9/16/2020</a:t>
+              <a:t>9/17/2020</a:t>
             </a:fld>
             <a:endParaRPr lang="en-US"/>
           </a:p>
@@ -7942,7 +8009,7 @@
           <a:p>
             <a:fld id="{FF797BD6-88EB-433B-A3D2-2B3B3AABDC4E}" type="datetimeFigureOut">
               <a:rPr lang="en-US" smtClean="0"/>
-              <a:t>9/16/2020</a:t>
+              <a:t>9/17/2020</a:t>
             </a:fld>
             <a:endParaRPr lang="en-US"/>
           </a:p>
@@ -8354,7 +8421,7 @@
           <a:p>
             <a:fld id="{FF797BD6-88EB-433B-A3D2-2B3B3AABDC4E}" type="datetimeFigureOut">
               <a:rPr lang="en-US" smtClean="0"/>
-              <a:t>9/16/2020</a:t>
+              <a:t>9/17/2020</a:t>
             </a:fld>
             <a:endParaRPr lang="en-US"/>
           </a:p>
@@ -8495,7 +8562,7 @@
           <a:p>
             <a:fld id="{FF797BD6-88EB-433B-A3D2-2B3B3AABDC4E}" type="datetimeFigureOut">
               <a:rPr lang="en-US" smtClean="0"/>
-              <a:t>9/16/2020</a:t>
+              <a:t>9/17/2020</a:t>
             </a:fld>
             <a:endParaRPr lang="en-US"/>
           </a:p>
@@ -8608,7 +8675,7 @@
           <a:p>
             <a:fld id="{FF797BD6-88EB-433B-A3D2-2B3B3AABDC4E}" type="datetimeFigureOut">
               <a:rPr lang="en-US" smtClean="0"/>
-              <a:t>9/16/2020</a:t>
+              <a:t>9/17/2020</a:t>
             </a:fld>
             <a:endParaRPr lang="en-US"/>
           </a:p>
@@ -8919,7 +8986,7 @@
           <a:p>
             <a:fld id="{FF797BD6-88EB-433B-A3D2-2B3B3AABDC4E}" type="datetimeFigureOut">
               <a:rPr lang="en-US" smtClean="0"/>
-              <a:t>9/16/2020</a:t>
+              <a:t>9/17/2020</a:t>
             </a:fld>
             <a:endParaRPr lang="en-US"/>
           </a:p>
@@ -9207,7 +9274,7 @@
           <a:p>
             <a:fld id="{FF797BD6-88EB-433B-A3D2-2B3B3AABDC4E}" type="datetimeFigureOut">
               <a:rPr lang="en-US" smtClean="0"/>
-              <a:t>9/16/2020</a:t>
+              <a:t>9/17/2020</a:t>
             </a:fld>
             <a:endParaRPr lang="en-US"/>
           </a:p>
@@ -9451,7 +9518,7 @@
             <a:fld id="{FF797BD6-88EB-433B-A3D2-2B3B3AABDC4E}" type="datetimeFigureOut">
               <a:rPr lang="en-US" smtClean="0"/>
               <a:pPr/>
-              <a:t>9/16/2020</a:t>
+              <a:t>9/17/2020</a:t>
             </a:fld>
             <a:endParaRPr lang="en-US"/>
           </a:p>
@@ -10365,7 +10432,7 @@
                 <a:latin typeface="Roboto" panose="02000000000000000000" pitchFamily="2" charset="0"/>
                 <a:ea typeface="Roboto" panose="02000000000000000000" pitchFamily="2" charset="0"/>
               </a:rPr>
-              <a:t>Databases 101 for the Aspiring App Dev</a:t>
+              <a:t>Databases for the Aspiring App Dev</a:t>
             </a:r>
           </a:p>
         </p:txBody>
@@ -11133,31 +11200,6 @@
           </a:extLst>
         </p:spPr>
       </p:pic>
-      <p:sp>
-        <p:nvSpPr>
-          <p:cNvPr id="3" name="Content Placeholder 2">
-            <a:extLst>
-              <a:ext uri="{FF2B5EF4-FFF2-40B4-BE49-F238E27FC236}">
-                <a16:creationId xmlns:a16="http://schemas.microsoft.com/office/drawing/2014/main" id="{BD329BF1-A78F-43CB-AEA3-808C8EE3CF59}"/>
-              </a:ext>
-            </a:extLst>
-          </p:cNvPr>
-          <p:cNvSpPr>
-            <a:spLocks noGrp="1"/>
-          </p:cNvSpPr>
-          <p:nvPr>
-            <p:ph idx="1"/>
-          </p:nvPr>
-        </p:nvSpPr>
-        <p:spPr/>
-        <p:txBody>
-          <a:bodyPr/>
-          <a:lstStyle/>
-          <a:p>
-            <a:endParaRPr lang="en-US"/>
-          </a:p>
-        </p:txBody>
-      </p:sp>
     </p:spTree>
     <p:extLst>
       <p:ext uri="{BB962C8B-B14F-4D97-AF65-F5344CB8AC3E}">
@@ -12236,6 +12278,9 @@
                     <p:cTn id="3" fill="hold">
                       <p:stCondLst>
                         <p:cond delay="indefinite"/>
+                        <p:cond evt="onBegin" delay="0">
+                          <p:tn val="2"/>
+                        </p:cond>
                       </p:stCondLst>
                       <p:childTnLst>
                         <p:par>
@@ -12245,7 +12290,7 @@
                             </p:stCondLst>
                             <p:childTnLst>
                               <p:par>
-                                <p:cTn id="5" presetID="1" presetClass="entr" presetSubtype="0" fill="hold" grpId="0" nodeType="clickEffect">
+                                <p:cTn id="5" presetID="1" presetClass="entr" presetSubtype="0" fill="hold" grpId="0" nodeType="withEffect">
                                   <p:stCondLst>
                                     <p:cond delay="0"/>
                                   </p:stCondLst>
@@ -13191,6 +13236,17 @@
             <a:r>
               <a:rPr lang="en-US" sz="3200" dirty="0"/>
               <a:t>Oracle’s implementation = PLSQL</a:t>
+            </a:r>
+          </a:p>
+          <a:p>
+            <a:pPr lvl="1" fontAlgn="ctr">
+              <a:lnSpc>
+                <a:spcPct val="110000"/>
+              </a:lnSpc>
+            </a:pPr>
+            <a:r>
+              <a:rPr lang="en-US" sz="3200" dirty="0"/>
+              <a:t>IBM’s implementation = SQL</a:t>
             </a:r>
           </a:p>
         </p:txBody>
@@ -13752,7 +13808,7 @@
       </p:par>
     </p:tnLst>
     <p:bldLst>
-      <p:bldP spid="5" grpId="0" build="p"/>
+      <p:bldP spid="5" grpId="0" uiExpand="1" build="p"/>
     </p:bldLst>
   </p:timing>
 </p:sld>
@@ -13841,7 +13897,23 @@
             <a:pPr lvl="1" fontAlgn="ctr"/>
             <a:r>
               <a:rPr lang="en-US" sz="2800" dirty="0"/>
-              <a:t>I would rather you wait than fail.</a:t>
+              <a:t>I would rather you </a:t>
+            </a:r>
+            <a:r>
+              <a:rPr lang="en-US" sz="2800" b="1" dirty="0"/>
+              <a:t>wait</a:t>
+            </a:r>
+            <a:r>
+              <a:rPr lang="en-US" sz="2800" dirty="0"/>
+              <a:t> than </a:t>
+            </a:r>
+            <a:r>
+              <a:rPr lang="en-US" sz="2800" b="1" dirty="0"/>
+              <a:t>fail</a:t>
+            </a:r>
+            <a:r>
+              <a:rPr lang="en-US" sz="2800" dirty="0"/>
+              <a:t>.</a:t>
             </a:r>
           </a:p>
           <a:p>
@@ -13869,7 +13941,23 @@
             <a:pPr lvl="1" fontAlgn="ctr"/>
             <a:r>
               <a:rPr lang="en-US" sz="2800" dirty="0"/>
-              <a:t>I would rather you fail than wait.</a:t>
+              <a:t>I would rather you </a:t>
+            </a:r>
+            <a:r>
+              <a:rPr lang="en-US" sz="2800" b="1" dirty="0"/>
+              <a:t>fail</a:t>
+            </a:r>
+            <a:r>
+              <a:rPr lang="en-US" sz="2800" dirty="0"/>
+              <a:t> than </a:t>
+            </a:r>
+            <a:r>
+              <a:rPr lang="en-US" sz="2800" b="1" dirty="0"/>
+              <a:t>wait</a:t>
+            </a:r>
+            <a:r>
+              <a:rPr lang="en-US" sz="2800" dirty="0"/>
+              <a:t>.</a:t>
             </a:r>
           </a:p>
           <a:p>
@@ -14953,15 +15041,7 @@
           <a:p>
             <a:r>
               <a:rPr lang="en-US" sz="3600" dirty="0"/>
-              <a:t>Rapid </a:t>
-            </a:r>
-            <a:r>
-              <a:rPr lang="en-US" sz="3600" dirty="0" err="1"/>
-              <a:t>hyperscaling</a:t>
-            </a:r>
-            <a:r>
-              <a:rPr lang="en-US" sz="3600" dirty="0"/>
-              <a:t> with SQL solutions can be more complex than with NoSQL solutions. </a:t>
+              <a:t>Rapid, horizontal scaling with SQL solutions can be more complex than with NoSQL solutions. </a:t>
             </a:r>
           </a:p>
           <a:p>

</xml_diff>